<commit_message>
Add more documentation and remove extra Receive parameter
</commit_message>
<xml_diff>
--- a/bindings/uwp/devdoc/UwpAzureGateway.pptx
+++ b/bindings/uwp/devdoc/UwpAzureGateway.pptx
@@ -126,6 +126,9 @@
         </p14:section>
       </p14:sectionLst>
     </p:ext>
+    <p:ext uri="{EFAFB233-063F-42B5-8137-9DF3F51BA10A}">
+      <p15:sldGuideLst xmlns:p15="http://schemas.microsoft.com/office/powerpoint/2012/main"/>
+    </p:ext>
   </p:extLst>
 </p:presentation>
 </file>
@@ -261,7 +264,7 @@
           <a:p>
             <a:fld id="{12AD105B-5129-44D7-9754-C0501ACA9636}" type="datetimeFigureOut">
               <a:rPr lang="en-US" smtClean="0"/>
-              <a:t>6/30/2016</a:t>
+              <a:t>7/11/2016</a:t>
             </a:fld>
             <a:endParaRPr lang="en-US"/>
           </a:p>
@@ -431,7 +434,7 @@
           <a:p>
             <a:fld id="{12AD105B-5129-44D7-9754-C0501ACA9636}" type="datetimeFigureOut">
               <a:rPr lang="en-US" smtClean="0"/>
-              <a:t>6/30/2016</a:t>
+              <a:t>7/11/2016</a:t>
             </a:fld>
             <a:endParaRPr lang="en-US"/>
           </a:p>
@@ -611,7 +614,7 @@
           <a:p>
             <a:fld id="{12AD105B-5129-44D7-9754-C0501ACA9636}" type="datetimeFigureOut">
               <a:rPr lang="en-US" smtClean="0"/>
-              <a:t>6/30/2016</a:t>
+              <a:t>7/11/2016</a:t>
             </a:fld>
             <a:endParaRPr lang="en-US"/>
           </a:p>
@@ -781,7 +784,7 @@
           <a:p>
             <a:fld id="{12AD105B-5129-44D7-9754-C0501ACA9636}" type="datetimeFigureOut">
               <a:rPr lang="en-US" smtClean="0"/>
-              <a:t>6/30/2016</a:t>
+              <a:t>7/11/2016</a:t>
             </a:fld>
             <a:endParaRPr lang="en-US"/>
           </a:p>
@@ -1027,7 +1030,7 @@
           <a:p>
             <a:fld id="{12AD105B-5129-44D7-9754-C0501ACA9636}" type="datetimeFigureOut">
               <a:rPr lang="en-US" smtClean="0"/>
-              <a:t>6/30/2016</a:t>
+              <a:t>7/11/2016</a:t>
             </a:fld>
             <a:endParaRPr lang="en-US"/>
           </a:p>
@@ -1259,7 +1262,7 @@
           <a:p>
             <a:fld id="{12AD105B-5129-44D7-9754-C0501ACA9636}" type="datetimeFigureOut">
               <a:rPr lang="en-US" smtClean="0"/>
-              <a:t>6/30/2016</a:t>
+              <a:t>7/11/2016</a:t>
             </a:fld>
             <a:endParaRPr lang="en-US"/>
           </a:p>
@@ -1626,7 +1629,7 @@
           <a:p>
             <a:fld id="{12AD105B-5129-44D7-9754-C0501ACA9636}" type="datetimeFigureOut">
               <a:rPr lang="en-US" smtClean="0"/>
-              <a:t>6/30/2016</a:t>
+              <a:t>7/11/2016</a:t>
             </a:fld>
             <a:endParaRPr lang="en-US"/>
           </a:p>
@@ -1744,7 +1747,7 @@
           <a:p>
             <a:fld id="{12AD105B-5129-44D7-9754-C0501ACA9636}" type="datetimeFigureOut">
               <a:rPr lang="en-US" smtClean="0"/>
-              <a:t>6/30/2016</a:t>
+              <a:t>7/11/2016</a:t>
             </a:fld>
             <a:endParaRPr lang="en-US"/>
           </a:p>
@@ -1839,7 +1842,7 @@
           <a:p>
             <a:fld id="{12AD105B-5129-44D7-9754-C0501ACA9636}" type="datetimeFigureOut">
               <a:rPr lang="en-US" smtClean="0"/>
-              <a:t>6/30/2016</a:t>
+              <a:t>7/11/2016</a:t>
             </a:fld>
             <a:endParaRPr lang="en-US"/>
           </a:p>
@@ -2116,7 +2119,7 @@
           <a:p>
             <a:fld id="{12AD105B-5129-44D7-9754-C0501ACA9636}" type="datetimeFigureOut">
               <a:rPr lang="en-US" smtClean="0"/>
-              <a:t>6/30/2016</a:t>
+              <a:t>7/11/2016</a:t>
             </a:fld>
             <a:endParaRPr lang="en-US"/>
           </a:p>
@@ -2369,7 +2372,7 @@
           <a:p>
             <a:fld id="{12AD105B-5129-44D7-9754-C0501ACA9636}" type="datetimeFigureOut">
               <a:rPr lang="en-US" smtClean="0"/>
-              <a:t>6/30/2016</a:t>
+              <a:t>7/11/2016</a:t>
             </a:fld>
             <a:endParaRPr lang="en-US"/>
           </a:p>
@@ -2582,7 +2585,7 @@
           <a:p>
             <a:fld id="{12AD105B-5129-44D7-9754-C0501ACA9636}" type="datetimeFigureOut">
               <a:rPr lang="en-US" smtClean="0"/>
-              <a:t>6/30/2016</a:t>
+              <a:t>7/11/2016</a:t>
             </a:fld>
             <a:endParaRPr lang="en-US"/>
           </a:p>
@@ -3175,522 +3178,537 @@
           </a:p>
         </p:txBody>
       </p:sp>
-      <p:sp>
-        <p:nvSpPr>
-          <p:cNvPr id="4" name="Rectangle 3"/>
-          <p:cNvSpPr/>
+      <p:grpSp>
+        <p:nvGrpSpPr>
+          <p:cNvPr id="3" name="Group 2"/>
+          <p:cNvGrpSpPr/>
           <p:nvPr/>
-        </p:nvSpPr>
-        <p:spPr>
+        </p:nvGrpSpPr>
+        <p:grpSpPr>
           <a:xfrm>
-            <a:off x="2245895" y="4705350"/>
-            <a:ext cx="6858000" cy="1828800"/>
+            <a:off x="2244891" y="1491314"/>
+            <a:ext cx="6864518" cy="5042836"/>
+            <a:chOff x="2244891" y="1491314"/>
+            <a:chExt cx="6864518" cy="5042836"/>
           </a:xfrm>
-          <a:prstGeom prst="rect">
-            <a:avLst/>
-          </a:prstGeom>
-        </p:spPr>
-        <p:style>
-          <a:lnRef idx="2">
-            <a:schemeClr val="accent1">
-              <a:shade val="50000"/>
-            </a:schemeClr>
-          </a:lnRef>
-          <a:fillRef idx="1">
-            <a:schemeClr val="accent1"/>
-          </a:fillRef>
-          <a:effectRef idx="0">
-            <a:schemeClr val="accent1"/>
-          </a:effectRef>
-          <a:fontRef idx="minor">
-            <a:schemeClr val="lt1"/>
-          </a:fontRef>
-        </p:style>
-        <p:txBody>
-          <a:bodyPr rtlCol="0" anchor="ctr"/>
-          <a:lstStyle/>
-          <a:p>
-            <a:pPr algn="ctr"/>
-            <a:endParaRPr lang="en-US" dirty="0" smtClean="0"/>
-          </a:p>
-          <a:p>
-            <a:pPr algn="ctr"/>
-            <a:endParaRPr lang="en-US" dirty="0"/>
-          </a:p>
-          <a:p>
-            <a:pPr algn="ctr"/>
-            <a:r>
-              <a:rPr lang="en-US" dirty="0" smtClean="0"/>
-              <a:t>Existing Gateway code implementation</a:t>
-            </a:r>
-            <a:endParaRPr lang="en-US" dirty="0"/>
-          </a:p>
-        </p:txBody>
-      </p:sp>
-      <p:sp>
-        <p:nvSpPr>
-          <p:cNvPr id="7" name="Rectangle 6"/>
-          <p:cNvSpPr/>
-          <p:nvPr/>
-        </p:nvSpPr>
-        <p:spPr>
-          <a:xfrm>
-            <a:off x="2244891" y="5070808"/>
-            <a:ext cx="6858000" cy="365760"/>
-          </a:xfrm>
-          <a:prstGeom prst="rect">
-            <a:avLst/>
-          </a:prstGeom>
-        </p:spPr>
-        <p:style>
-          <a:lnRef idx="2">
-            <a:schemeClr val="accent3">
-              <a:shade val="50000"/>
-            </a:schemeClr>
-          </a:lnRef>
-          <a:fillRef idx="1">
-            <a:schemeClr val="accent3"/>
-          </a:fillRef>
-          <a:effectRef idx="0">
-            <a:schemeClr val="accent3"/>
-          </a:effectRef>
-          <a:fontRef idx="minor">
-            <a:schemeClr val="lt1"/>
-          </a:fontRef>
-        </p:style>
-        <p:txBody>
-          <a:bodyPr rtlCol="0" anchor="ctr"/>
-          <a:lstStyle/>
-          <a:p>
-            <a:pPr algn="ctr"/>
-            <a:r>
-              <a:rPr lang="en-US" dirty="0" smtClean="0"/>
-              <a:t>Modifications of existing APIs</a:t>
-            </a:r>
-            <a:endParaRPr lang="en-US" dirty="0"/>
-          </a:p>
-        </p:txBody>
-      </p:sp>
-      <p:sp>
-        <p:nvSpPr>
-          <p:cNvPr id="8" name="Rectangle 7"/>
-          <p:cNvSpPr/>
-          <p:nvPr/>
-        </p:nvSpPr>
-        <p:spPr>
-          <a:xfrm>
-            <a:off x="2251409" y="4706854"/>
-            <a:ext cx="6858000" cy="365760"/>
-          </a:xfrm>
-          <a:prstGeom prst="rect">
-            <a:avLst/>
-          </a:prstGeom>
-        </p:spPr>
-        <p:style>
-          <a:lnRef idx="2">
-            <a:schemeClr val="accent4">
-              <a:shade val="50000"/>
-            </a:schemeClr>
-          </a:lnRef>
-          <a:fillRef idx="1">
-            <a:schemeClr val="accent4"/>
-          </a:fillRef>
-          <a:effectRef idx="0">
-            <a:schemeClr val="accent4"/>
-          </a:effectRef>
-          <a:fontRef idx="minor">
-            <a:schemeClr val="lt1"/>
-          </a:fontRef>
-        </p:style>
-        <p:txBody>
-          <a:bodyPr rtlCol="0" anchor="ctr"/>
-          <a:lstStyle/>
-          <a:p>
-            <a:pPr algn="ctr"/>
-            <a:r>
-              <a:rPr lang="en-US" dirty="0" smtClean="0"/>
-              <a:t>New Gateway APIs for use from UWP</a:t>
-            </a:r>
-            <a:endParaRPr lang="en-US" dirty="0"/>
-          </a:p>
-        </p:txBody>
-      </p:sp>
-      <p:sp>
-        <p:nvSpPr>
-          <p:cNvPr id="10" name="Rectangle 9"/>
-          <p:cNvSpPr/>
-          <p:nvPr/>
-        </p:nvSpPr>
-        <p:spPr>
-          <a:xfrm>
-            <a:off x="2245895" y="2948087"/>
-            <a:ext cx="6858000" cy="1097280"/>
-          </a:xfrm>
-          <a:prstGeom prst="rect">
-            <a:avLst/>
-          </a:prstGeom>
-        </p:spPr>
-        <p:style>
-          <a:lnRef idx="2">
-            <a:schemeClr val="accent6">
-              <a:shade val="50000"/>
-            </a:schemeClr>
-          </a:lnRef>
-          <a:fillRef idx="1">
-            <a:schemeClr val="accent6"/>
-          </a:fillRef>
-          <a:effectRef idx="0">
-            <a:schemeClr val="accent6"/>
-          </a:effectRef>
-          <a:fontRef idx="minor">
-            <a:schemeClr val="lt1"/>
-          </a:fontRef>
-        </p:style>
-        <p:txBody>
-          <a:bodyPr rtlCol="0" anchor="ctr"/>
-          <a:lstStyle/>
-          <a:p>
-            <a:pPr algn="ctr"/>
-            <a:endParaRPr lang="en-US" dirty="0" smtClean="0"/>
-          </a:p>
-          <a:p>
-            <a:pPr algn="ctr"/>
-            <a:endParaRPr lang="en-US" dirty="0"/>
-          </a:p>
-          <a:p>
-            <a:pPr algn="ctr"/>
-            <a:endParaRPr lang="en-US" dirty="0" smtClean="0"/>
-          </a:p>
-          <a:p>
-            <a:pPr algn="ctr"/>
-            <a:endParaRPr lang="en-US" dirty="0"/>
-          </a:p>
-          <a:p>
-            <a:pPr algn="ctr"/>
-            <a:r>
-              <a:rPr lang="en-US" dirty="0" err="1" smtClean="0"/>
-              <a:t>Microsoft.Azure.IoT.Gateway</a:t>
-            </a:r>
-            <a:endParaRPr lang="en-US" dirty="0" smtClean="0"/>
-          </a:p>
-          <a:p>
-            <a:pPr algn="ctr"/>
-            <a:endParaRPr lang="en-US" dirty="0"/>
-          </a:p>
-          <a:p>
-            <a:pPr algn="ctr"/>
-            <a:endParaRPr lang="en-US" dirty="0" smtClean="0"/>
-          </a:p>
-          <a:p>
-            <a:pPr algn="ctr"/>
-            <a:endParaRPr lang="en-US" dirty="0"/>
-          </a:p>
-          <a:p>
-            <a:pPr algn="ctr"/>
-            <a:endParaRPr lang="en-US" dirty="0"/>
-          </a:p>
-        </p:txBody>
-      </p:sp>
-      <p:sp>
-        <p:nvSpPr>
-          <p:cNvPr id="11" name="Rectangle 10"/>
-          <p:cNvSpPr/>
-          <p:nvPr/>
-        </p:nvSpPr>
-        <p:spPr>
-          <a:xfrm>
-            <a:off x="2254416" y="3686652"/>
-            <a:ext cx="2286000" cy="365760"/>
-          </a:xfrm>
-          <a:prstGeom prst="rect">
-            <a:avLst/>
-          </a:prstGeom>
-        </p:spPr>
-        <p:style>
-          <a:lnRef idx="1">
-            <a:schemeClr val="accent3"/>
-          </a:lnRef>
-          <a:fillRef idx="2">
-            <a:schemeClr val="accent3"/>
-          </a:fillRef>
-          <a:effectRef idx="1">
-            <a:schemeClr val="accent3"/>
-          </a:effectRef>
-          <a:fontRef idx="minor">
-            <a:schemeClr val="dk1"/>
-          </a:fontRef>
-        </p:style>
-        <p:txBody>
-          <a:bodyPr rtlCol="0" anchor="ctr"/>
-          <a:lstStyle/>
-          <a:p>
-            <a:pPr algn="ctr"/>
-            <a:r>
-              <a:rPr lang="en-US" dirty="0" smtClean="0"/>
-              <a:t>Gateway</a:t>
-            </a:r>
-            <a:endParaRPr lang="en-US" dirty="0"/>
-          </a:p>
-        </p:txBody>
-      </p:sp>
-      <p:sp>
-        <p:nvSpPr>
-          <p:cNvPr id="12" name="Rectangle 11"/>
-          <p:cNvSpPr/>
-          <p:nvPr/>
-        </p:nvSpPr>
-        <p:spPr>
-          <a:xfrm>
-            <a:off x="4575509" y="2948087"/>
-            <a:ext cx="2286000" cy="365760"/>
-          </a:xfrm>
-          <a:prstGeom prst="rect">
-            <a:avLst/>
-          </a:prstGeom>
-        </p:spPr>
-        <p:style>
-          <a:lnRef idx="1">
-            <a:schemeClr val="accent3"/>
-          </a:lnRef>
-          <a:fillRef idx="2">
-            <a:schemeClr val="accent3"/>
-          </a:fillRef>
-          <a:effectRef idx="1">
-            <a:schemeClr val="accent3"/>
-          </a:effectRef>
-          <a:fontRef idx="minor">
-            <a:schemeClr val="dk1"/>
-          </a:fontRef>
-        </p:style>
-        <p:txBody>
-          <a:bodyPr rtlCol="0" anchor="ctr"/>
-          <a:lstStyle/>
-          <a:p>
-            <a:pPr algn="ctr"/>
-            <a:r>
-              <a:rPr lang="en-US" dirty="0" err="1" smtClean="0"/>
-              <a:t>IGatewayModule</a:t>
-            </a:r>
-            <a:endParaRPr lang="en-US" dirty="0"/>
-          </a:p>
-        </p:txBody>
-      </p:sp>
-      <p:sp>
-        <p:nvSpPr>
-          <p:cNvPr id="13" name="Rectangle 12"/>
-          <p:cNvSpPr/>
-          <p:nvPr/>
-        </p:nvSpPr>
-        <p:spPr>
-          <a:xfrm>
-            <a:off x="4539412" y="3686324"/>
-            <a:ext cx="2286000" cy="365760"/>
-          </a:xfrm>
-          <a:prstGeom prst="rect">
-            <a:avLst/>
-          </a:prstGeom>
-        </p:spPr>
-        <p:style>
-          <a:lnRef idx="1">
-            <a:schemeClr val="accent3"/>
-          </a:lnRef>
-          <a:fillRef idx="2">
-            <a:schemeClr val="accent3"/>
-          </a:fillRef>
-          <a:effectRef idx="1">
-            <a:schemeClr val="accent3"/>
-          </a:effectRef>
-          <a:fontRef idx="minor">
-            <a:schemeClr val="dk1"/>
-          </a:fontRef>
-        </p:style>
-        <p:txBody>
-          <a:bodyPr rtlCol="0" anchor="ctr"/>
-          <a:lstStyle/>
-          <a:p>
-            <a:pPr algn="ctr"/>
-            <a:r>
-              <a:rPr lang="en-US" dirty="0" err="1" smtClean="0"/>
-              <a:t>MessageBus</a:t>
-            </a:r>
-            <a:endParaRPr lang="en-US" dirty="0"/>
-          </a:p>
-        </p:txBody>
-      </p:sp>
-      <p:sp>
-        <p:nvSpPr>
-          <p:cNvPr id="14" name="Rectangle 13"/>
-          <p:cNvSpPr/>
-          <p:nvPr/>
-        </p:nvSpPr>
-        <p:spPr>
-          <a:xfrm>
-            <a:off x="6823404" y="3686324"/>
-            <a:ext cx="2286000" cy="365760"/>
-          </a:xfrm>
-          <a:prstGeom prst="rect">
-            <a:avLst/>
-          </a:prstGeom>
-        </p:spPr>
-        <p:style>
-          <a:lnRef idx="1">
-            <a:schemeClr val="accent3"/>
-          </a:lnRef>
-          <a:fillRef idx="2">
-            <a:schemeClr val="accent3"/>
-          </a:fillRef>
-          <a:effectRef idx="1">
-            <a:schemeClr val="accent3"/>
-          </a:effectRef>
-          <a:fontRef idx="minor">
-            <a:schemeClr val="dk1"/>
-          </a:fontRef>
-        </p:style>
-        <p:txBody>
-          <a:bodyPr rtlCol="0" anchor="ctr"/>
-          <a:lstStyle/>
-          <a:p>
-            <a:pPr algn="ctr"/>
-            <a:r>
-              <a:rPr lang="en-US" dirty="0" smtClean="0"/>
-              <a:t>Message</a:t>
-            </a:r>
-            <a:endParaRPr lang="en-US" dirty="0"/>
-          </a:p>
-        </p:txBody>
-      </p:sp>
-      <p:sp>
-        <p:nvSpPr>
-          <p:cNvPr id="16" name="Rounded Rectangle 15"/>
-          <p:cNvSpPr/>
-          <p:nvPr/>
-        </p:nvSpPr>
-        <p:spPr>
-          <a:xfrm>
-            <a:off x="3790949" y="1491314"/>
-            <a:ext cx="1038225" cy="914400"/>
-          </a:xfrm>
-          <a:prstGeom prst="roundRect">
-            <a:avLst/>
-          </a:prstGeom>
-        </p:spPr>
-        <p:style>
-          <a:lnRef idx="2">
-            <a:schemeClr val="accent1">
-              <a:shade val="50000"/>
-            </a:schemeClr>
-          </a:lnRef>
-          <a:fillRef idx="1">
-            <a:schemeClr val="accent1"/>
-          </a:fillRef>
-          <a:effectRef idx="0">
-            <a:schemeClr val="accent1"/>
-          </a:effectRef>
-          <a:fontRef idx="minor">
-            <a:schemeClr val="lt1"/>
-          </a:fontRef>
-        </p:style>
-        <p:txBody>
-          <a:bodyPr rtlCol="0" anchor="ctr"/>
-          <a:lstStyle/>
-          <a:p>
-            <a:pPr algn="ctr"/>
-            <a:r>
-              <a:rPr lang="en-US" dirty="0" smtClean="0"/>
-              <a:t>User Module</a:t>
-            </a:r>
-            <a:endParaRPr lang="en-US" dirty="0"/>
-          </a:p>
-        </p:txBody>
-      </p:sp>
-      <p:sp>
-        <p:nvSpPr>
-          <p:cNvPr id="17" name="Rounded Rectangle 16"/>
-          <p:cNvSpPr/>
-          <p:nvPr/>
-        </p:nvSpPr>
-        <p:spPr>
-          <a:xfrm>
-            <a:off x="5199396" y="1491314"/>
-            <a:ext cx="1038225" cy="914400"/>
-          </a:xfrm>
-          <a:prstGeom prst="roundRect">
-            <a:avLst/>
-          </a:prstGeom>
-        </p:spPr>
-        <p:style>
-          <a:lnRef idx="2">
-            <a:schemeClr val="accent1">
-              <a:shade val="50000"/>
-            </a:schemeClr>
-          </a:lnRef>
-          <a:fillRef idx="1">
-            <a:schemeClr val="accent1"/>
-          </a:fillRef>
-          <a:effectRef idx="0">
-            <a:schemeClr val="accent1"/>
-          </a:effectRef>
-          <a:fontRef idx="minor">
-            <a:schemeClr val="lt1"/>
-          </a:fontRef>
-        </p:style>
-        <p:txBody>
-          <a:bodyPr rtlCol="0" anchor="ctr"/>
-          <a:lstStyle/>
-          <a:p>
-            <a:pPr algn="ctr"/>
-            <a:r>
-              <a:rPr lang="en-US" dirty="0" smtClean="0"/>
-              <a:t>User Module</a:t>
-            </a:r>
-            <a:endParaRPr lang="en-US" dirty="0"/>
-          </a:p>
-        </p:txBody>
-      </p:sp>
-      <p:sp>
-        <p:nvSpPr>
-          <p:cNvPr id="18" name="Rounded Rectangle 17"/>
-          <p:cNvSpPr/>
-          <p:nvPr/>
-        </p:nvSpPr>
-        <p:spPr>
-          <a:xfrm>
-            <a:off x="6607843" y="1491314"/>
-            <a:ext cx="1038225" cy="914400"/>
-          </a:xfrm>
-          <a:prstGeom prst="roundRect">
-            <a:avLst/>
-          </a:prstGeom>
-        </p:spPr>
-        <p:style>
-          <a:lnRef idx="2">
-            <a:schemeClr val="accent1">
-              <a:shade val="50000"/>
-            </a:schemeClr>
-          </a:lnRef>
-          <a:fillRef idx="1">
-            <a:schemeClr val="accent1"/>
-          </a:fillRef>
-          <a:effectRef idx="0">
-            <a:schemeClr val="accent1"/>
-          </a:effectRef>
-          <a:fontRef idx="minor">
-            <a:schemeClr val="lt1"/>
-          </a:fontRef>
-        </p:style>
-        <p:txBody>
-          <a:bodyPr rtlCol="0" anchor="ctr"/>
-          <a:lstStyle/>
-          <a:p>
-            <a:pPr algn="ctr"/>
-            <a:r>
-              <a:rPr lang="en-US" dirty="0" smtClean="0"/>
-              <a:t>User Module</a:t>
-            </a:r>
-            <a:endParaRPr lang="en-US" dirty="0"/>
-          </a:p>
-        </p:txBody>
-      </p:sp>
+        </p:grpSpPr>
+        <p:sp>
+          <p:nvSpPr>
+            <p:cNvPr id="4" name="Rectangle 3"/>
+            <p:cNvSpPr/>
+            <p:nvPr/>
+          </p:nvSpPr>
+          <p:spPr>
+            <a:xfrm>
+              <a:off x="2245895" y="4705350"/>
+              <a:ext cx="6858000" cy="1828800"/>
+            </a:xfrm>
+            <a:prstGeom prst="rect">
+              <a:avLst/>
+            </a:prstGeom>
+          </p:spPr>
+          <p:style>
+            <a:lnRef idx="2">
+              <a:schemeClr val="accent1">
+                <a:shade val="50000"/>
+              </a:schemeClr>
+            </a:lnRef>
+            <a:fillRef idx="1">
+              <a:schemeClr val="accent1"/>
+            </a:fillRef>
+            <a:effectRef idx="0">
+              <a:schemeClr val="accent1"/>
+            </a:effectRef>
+            <a:fontRef idx="minor">
+              <a:schemeClr val="lt1"/>
+            </a:fontRef>
+          </p:style>
+          <p:txBody>
+            <a:bodyPr rtlCol="0" anchor="ctr"/>
+            <a:lstStyle/>
+            <a:p>
+              <a:pPr algn="ctr"/>
+              <a:endParaRPr lang="en-US" dirty="0" smtClean="0"/>
+            </a:p>
+            <a:p>
+              <a:pPr algn="ctr"/>
+              <a:endParaRPr lang="en-US" dirty="0"/>
+            </a:p>
+            <a:p>
+              <a:pPr algn="ctr"/>
+              <a:r>
+                <a:rPr lang="en-US" dirty="0" smtClean="0"/>
+                <a:t>Existing Gateway code implementation</a:t>
+              </a:r>
+              <a:endParaRPr lang="en-US" dirty="0"/>
+            </a:p>
+          </p:txBody>
+        </p:sp>
+        <p:sp>
+          <p:nvSpPr>
+            <p:cNvPr id="7" name="Rectangle 6"/>
+            <p:cNvSpPr/>
+            <p:nvPr/>
+          </p:nvSpPr>
+          <p:spPr>
+            <a:xfrm>
+              <a:off x="2244891" y="5070808"/>
+              <a:ext cx="6858000" cy="365760"/>
+            </a:xfrm>
+            <a:prstGeom prst="rect">
+              <a:avLst/>
+            </a:prstGeom>
+          </p:spPr>
+          <p:style>
+            <a:lnRef idx="2">
+              <a:schemeClr val="accent3">
+                <a:shade val="50000"/>
+              </a:schemeClr>
+            </a:lnRef>
+            <a:fillRef idx="1">
+              <a:schemeClr val="accent3"/>
+            </a:fillRef>
+            <a:effectRef idx="0">
+              <a:schemeClr val="accent3"/>
+            </a:effectRef>
+            <a:fontRef idx="minor">
+              <a:schemeClr val="lt1"/>
+            </a:fontRef>
+          </p:style>
+          <p:txBody>
+            <a:bodyPr rtlCol="0" anchor="ctr"/>
+            <a:lstStyle/>
+            <a:p>
+              <a:pPr algn="ctr"/>
+              <a:r>
+                <a:rPr lang="en-US" dirty="0" smtClean="0"/>
+                <a:t>Modifications of existing APIs</a:t>
+              </a:r>
+              <a:endParaRPr lang="en-US" dirty="0"/>
+            </a:p>
+          </p:txBody>
+        </p:sp>
+        <p:sp>
+          <p:nvSpPr>
+            <p:cNvPr id="8" name="Rectangle 7"/>
+            <p:cNvSpPr/>
+            <p:nvPr/>
+          </p:nvSpPr>
+          <p:spPr>
+            <a:xfrm>
+              <a:off x="2251409" y="4706854"/>
+              <a:ext cx="6858000" cy="365760"/>
+            </a:xfrm>
+            <a:prstGeom prst="rect">
+              <a:avLst/>
+            </a:prstGeom>
+          </p:spPr>
+          <p:style>
+            <a:lnRef idx="2">
+              <a:schemeClr val="accent4">
+                <a:shade val="50000"/>
+              </a:schemeClr>
+            </a:lnRef>
+            <a:fillRef idx="1">
+              <a:schemeClr val="accent4"/>
+            </a:fillRef>
+            <a:effectRef idx="0">
+              <a:schemeClr val="accent4"/>
+            </a:effectRef>
+            <a:fontRef idx="minor">
+              <a:schemeClr val="lt1"/>
+            </a:fontRef>
+          </p:style>
+          <p:txBody>
+            <a:bodyPr rtlCol="0" anchor="ctr"/>
+            <a:lstStyle/>
+            <a:p>
+              <a:pPr algn="ctr"/>
+              <a:r>
+                <a:rPr lang="en-US" dirty="0" smtClean="0"/>
+                <a:t>New Gateway APIs for use from UWP</a:t>
+              </a:r>
+              <a:endParaRPr lang="en-US" dirty="0"/>
+            </a:p>
+          </p:txBody>
+        </p:sp>
+        <p:sp>
+          <p:nvSpPr>
+            <p:cNvPr id="10" name="Rectangle 9"/>
+            <p:cNvSpPr/>
+            <p:nvPr/>
+          </p:nvSpPr>
+          <p:spPr>
+            <a:xfrm>
+              <a:off x="2245895" y="2948087"/>
+              <a:ext cx="6858000" cy="1097280"/>
+            </a:xfrm>
+            <a:prstGeom prst="rect">
+              <a:avLst/>
+            </a:prstGeom>
+          </p:spPr>
+          <p:style>
+            <a:lnRef idx="2">
+              <a:schemeClr val="accent6">
+                <a:shade val="50000"/>
+              </a:schemeClr>
+            </a:lnRef>
+            <a:fillRef idx="1">
+              <a:schemeClr val="accent6"/>
+            </a:fillRef>
+            <a:effectRef idx="0">
+              <a:schemeClr val="accent6"/>
+            </a:effectRef>
+            <a:fontRef idx="minor">
+              <a:schemeClr val="lt1"/>
+            </a:fontRef>
+          </p:style>
+          <p:txBody>
+            <a:bodyPr rtlCol="0" anchor="ctr"/>
+            <a:lstStyle/>
+            <a:p>
+              <a:pPr algn="ctr"/>
+              <a:endParaRPr lang="en-US" dirty="0" smtClean="0"/>
+            </a:p>
+            <a:p>
+              <a:pPr algn="ctr"/>
+              <a:endParaRPr lang="en-US" dirty="0"/>
+            </a:p>
+            <a:p>
+              <a:pPr algn="ctr"/>
+              <a:endParaRPr lang="en-US" dirty="0" smtClean="0"/>
+            </a:p>
+            <a:p>
+              <a:pPr algn="ctr"/>
+              <a:endParaRPr lang="en-US" dirty="0"/>
+            </a:p>
+            <a:p>
+              <a:pPr algn="ctr"/>
+              <a:r>
+                <a:rPr lang="en-US" dirty="0" err="1" smtClean="0"/>
+                <a:t>Microsoft.Azure.IoT.Gateway</a:t>
+              </a:r>
+              <a:endParaRPr lang="en-US" dirty="0" smtClean="0"/>
+            </a:p>
+            <a:p>
+              <a:pPr algn="ctr"/>
+              <a:endParaRPr lang="en-US" dirty="0"/>
+            </a:p>
+            <a:p>
+              <a:pPr algn="ctr"/>
+              <a:endParaRPr lang="en-US" dirty="0" smtClean="0"/>
+            </a:p>
+            <a:p>
+              <a:pPr algn="ctr"/>
+              <a:endParaRPr lang="en-US" dirty="0"/>
+            </a:p>
+            <a:p>
+              <a:pPr algn="ctr"/>
+              <a:endParaRPr lang="en-US" dirty="0"/>
+            </a:p>
+          </p:txBody>
+        </p:sp>
+        <p:sp>
+          <p:nvSpPr>
+            <p:cNvPr id="11" name="Rectangle 10"/>
+            <p:cNvSpPr/>
+            <p:nvPr/>
+          </p:nvSpPr>
+          <p:spPr>
+            <a:xfrm>
+              <a:off x="2254416" y="3686652"/>
+              <a:ext cx="2286000" cy="365760"/>
+            </a:xfrm>
+            <a:prstGeom prst="rect">
+              <a:avLst/>
+            </a:prstGeom>
+          </p:spPr>
+          <p:style>
+            <a:lnRef idx="1">
+              <a:schemeClr val="accent3"/>
+            </a:lnRef>
+            <a:fillRef idx="2">
+              <a:schemeClr val="accent3"/>
+            </a:fillRef>
+            <a:effectRef idx="1">
+              <a:schemeClr val="accent3"/>
+            </a:effectRef>
+            <a:fontRef idx="minor">
+              <a:schemeClr val="dk1"/>
+            </a:fontRef>
+          </p:style>
+          <p:txBody>
+            <a:bodyPr rtlCol="0" anchor="ctr"/>
+            <a:lstStyle/>
+            <a:p>
+              <a:pPr algn="ctr"/>
+              <a:r>
+                <a:rPr lang="en-US" dirty="0" smtClean="0"/>
+                <a:t>Gateway</a:t>
+              </a:r>
+              <a:endParaRPr lang="en-US" dirty="0"/>
+            </a:p>
+          </p:txBody>
+        </p:sp>
+        <p:sp>
+          <p:nvSpPr>
+            <p:cNvPr id="12" name="Rectangle 11"/>
+            <p:cNvSpPr/>
+            <p:nvPr/>
+          </p:nvSpPr>
+          <p:spPr>
+            <a:xfrm>
+              <a:off x="4575509" y="2948087"/>
+              <a:ext cx="2286000" cy="365760"/>
+            </a:xfrm>
+            <a:prstGeom prst="rect">
+              <a:avLst/>
+            </a:prstGeom>
+          </p:spPr>
+          <p:style>
+            <a:lnRef idx="1">
+              <a:schemeClr val="accent3"/>
+            </a:lnRef>
+            <a:fillRef idx="2">
+              <a:schemeClr val="accent3"/>
+            </a:fillRef>
+            <a:effectRef idx="1">
+              <a:schemeClr val="accent3"/>
+            </a:effectRef>
+            <a:fontRef idx="minor">
+              <a:schemeClr val="dk1"/>
+            </a:fontRef>
+          </p:style>
+          <p:txBody>
+            <a:bodyPr rtlCol="0" anchor="ctr"/>
+            <a:lstStyle/>
+            <a:p>
+              <a:pPr algn="ctr"/>
+              <a:r>
+                <a:rPr lang="en-US" dirty="0" err="1" smtClean="0"/>
+                <a:t>IGatewayModule</a:t>
+              </a:r>
+              <a:endParaRPr lang="en-US" dirty="0"/>
+            </a:p>
+          </p:txBody>
+        </p:sp>
+        <p:sp>
+          <p:nvSpPr>
+            <p:cNvPr id="13" name="Rectangle 12"/>
+            <p:cNvSpPr/>
+            <p:nvPr/>
+          </p:nvSpPr>
+          <p:spPr>
+            <a:xfrm>
+              <a:off x="4539412" y="3686324"/>
+              <a:ext cx="2286000" cy="365760"/>
+            </a:xfrm>
+            <a:prstGeom prst="rect">
+              <a:avLst/>
+            </a:prstGeom>
+          </p:spPr>
+          <p:style>
+            <a:lnRef idx="1">
+              <a:schemeClr val="accent3"/>
+            </a:lnRef>
+            <a:fillRef idx="2">
+              <a:schemeClr val="accent3"/>
+            </a:fillRef>
+            <a:effectRef idx="1">
+              <a:schemeClr val="accent3"/>
+            </a:effectRef>
+            <a:fontRef idx="minor">
+              <a:schemeClr val="dk1"/>
+            </a:fontRef>
+          </p:style>
+          <p:txBody>
+            <a:bodyPr rtlCol="0" anchor="ctr"/>
+            <a:lstStyle/>
+            <a:p>
+              <a:pPr algn="ctr"/>
+              <a:r>
+                <a:rPr lang="en-US" dirty="0" err="1" smtClean="0"/>
+                <a:t>MessageBus</a:t>
+              </a:r>
+              <a:endParaRPr lang="en-US" dirty="0"/>
+            </a:p>
+          </p:txBody>
+        </p:sp>
+        <p:sp>
+          <p:nvSpPr>
+            <p:cNvPr id="14" name="Rectangle 13"/>
+            <p:cNvSpPr/>
+            <p:nvPr/>
+          </p:nvSpPr>
+          <p:spPr>
+            <a:xfrm>
+              <a:off x="6823404" y="3686324"/>
+              <a:ext cx="2286000" cy="365760"/>
+            </a:xfrm>
+            <a:prstGeom prst="rect">
+              <a:avLst/>
+            </a:prstGeom>
+          </p:spPr>
+          <p:style>
+            <a:lnRef idx="1">
+              <a:schemeClr val="accent3"/>
+            </a:lnRef>
+            <a:fillRef idx="2">
+              <a:schemeClr val="accent3"/>
+            </a:fillRef>
+            <a:effectRef idx="1">
+              <a:schemeClr val="accent3"/>
+            </a:effectRef>
+            <a:fontRef idx="minor">
+              <a:schemeClr val="dk1"/>
+            </a:fontRef>
+          </p:style>
+          <p:txBody>
+            <a:bodyPr rtlCol="0" anchor="ctr"/>
+            <a:lstStyle/>
+            <a:p>
+              <a:pPr algn="ctr"/>
+              <a:r>
+                <a:rPr lang="en-US" dirty="0" smtClean="0"/>
+                <a:t>Message</a:t>
+              </a:r>
+              <a:endParaRPr lang="en-US" dirty="0"/>
+            </a:p>
+          </p:txBody>
+        </p:sp>
+        <p:sp>
+          <p:nvSpPr>
+            <p:cNvPr id="16" name="Rounded Rectangle 15"/>
+            <p:cNvSpPr/>
+            <p:nvPr/>
+          </p:nvSpPr>
+          <p:spPr>
+            <a:xfrm>
+              <a:off x="3790949" y="1491314"/>
+              <a:ext cx="1038225" cy="914400"/>
+            </a:xfrm>
+            <a:prstGeom prst="roundRect">
+              <a:avLst/>
+            </a:prstGeom>
+          </p:spPr>
+          <p:style>
+            <a:lnRef idx="2">
+              <a:schemeClr val="accent1">
+                <a:shade val="50000"/>
+              </a:schemeClr>
+            </a:lnRef>
+            <a:fillRef idx="1">
+              <a:schemeClr val="accent1"/>
+            </a:fillRef>
+            <a:effectRef idx="0">
+              <a:schemeClr val="accent1"/>
+            </a:effectRef>
+            <a:fontRef idx="minor">
+              <a:schemeClr val="lt1"/>
+            </a:fontRef>
+          </p:style>
+          <p:txBody>
+            <a:bodyPr rtlCol="0" anchor="ctr"/>
+            <a:lstStyle/>
+            <a:p>
+              <a:pPr algn="ctr"/>
+              <a:r>
+                <a:rPr lang="en-US" dirty="0" smtClean="0"/>
+                <a:t>User Module</a:t>
+              </a:r>
+              <a:endParaRPr lang="en-US" dirty="0"/>
+            </a:p>
+          </p:txBody>
+        </p:sp>
+        <p:sp>
+          <p:nvSpPr>
+            <p:cNvPr id="17" name="Rounded Rectangle 16"/>
+            <p:cNvSpPr/>
+            <p:nvPr/>
+          </p:nvSpPr>
+          <p:spPr>
+            <a:xfrm>
+              <a:off x="5199396" y="1491314"/>
+              <a:ext cx="1038225" cy="914400"/>
+            </a:xfrm>
+            <a:prstGeom prst="roundRect">
+              <a:avLst/>
+            </a:prstGeom>
+          </p:spPr>
+          <p:style>
+            <a:lnRef idx="2">
+              <a:schemeClr val="accent1">
+                <a:shade val="50000"/>
+              </a:schemeClr>
+            </a:lnRef>
+            <a:fillRef idx="1">
+              <a:schemeClr val="accent1"/>
+            </a:fillRef>
+            <a:effectRef idx="0">
+              <a:schemeClr val="accent1"/>
+            </a:effectRef>
+            <a:fontRef idx="minor">
+              <a:schemeClr val="lt1"/>
+            </a:fontRef>
+          </p:style>
+          <p:txBody>
+            <a:bodyPr rtlCol="0" anchor="ctr"/>
+            <a:lstStyle/>
+            <a:p>
+              <a:pPr algn="ctr"/>
+              <a:r>
+                <a:rPr lang="en-US" dirty="0" smtClean="0"/>
+                <a:t>User Module</a:t>
+              </a:r>
+              <a:endParaRPr lang="en-US" dirty="0"/>
+            </a:p>
+          </p:txBody>
+        </p:sp>
+        <p:sp>
+          <p:nvSpPr>
+            <p:cNvPr id="18" name="Rounded Rectangle 17"/>
+            <p:cNvSpPr/>
+            <p:nvPr/>
+          </p:nvSpPr>
+          <p:spPr>
+            <a:xfrm>
+              <a:off x="6607843" y="1491314"/>
+              <a:ext cx="1038225" cy="914400"/>
+            </a:xfrm>
+            <a:prstGeom prst="roundRect">
+              <a:avLst/>
+            </a:prstGeom>
+          </p:spPr>
+          <p:style>
+            <a:lnRef idx="2">
+              <a:schemeClr val="accent1">
+                <a:shade val="50000"/>
+              </a:schemeClr>
+            </a:lnRef>
+            <a:fillRef idx="1">
+              <a:schemeClr val="accent1"/>
+            </a:fillRef>
+            <a:effectRef idx="0">
+              <a:schemeClr val="accent1"/>
+            </a:effectRef>
+            <a:fontRef idx="minor">
+              <a:schemeClr val="lt1"/>
+            </a:fontRef>
+          </p:style>
+          <p:txBody>
+            <a:bodyPr rtlCol="0" anchor="ctr"/>
+            <a:lstStyle/>
+            <a:p>
+              <a:pPr algn="ctr"/>
+              <a:r>
+                <a:rPr lang="en-US" dirty="0" smtClean="0"/>
+                <a:t>User Module</a:t>
+              </a:r>
+              <a:endParaRPr lang="en-US" dirty="0"/>
+            </a:p>
+          </p:txBody>
+        </p:sp>
+      </p:grpSp>
     </p:spTree>
     <p:extLst>
       <p:ext uri="{BB962C8B-B14F-4D97-AF65-F5344CB8AC3E}">

</xml_diff>